<commit_message>
small scan works now
</commit_message>
<xml_diff>
--- a/Presentation1.pptx
+++ b/Presentation1.pptx
@@ -261,7 +261,7 @@
           <a:p>
             <a:fld id="{78381842-BAF7-452C-8AA1-F4B9FB81DF9C}" type="datetimeFigureOut">
               <a:rPr lang="en-IN" smtClean="0"/>
-              <a:t>28-12-2019</a:t>
+              <a:t>28-01-2020</a:t>
             </a:fld>
             <a:endParaRPr lang="en-IN"/>
           </a:p>
@@ -461,7 +461,7 @@
           <a:p>
             <a:fld id="{78381842-BAF7-452C-8AA1-F4B9FB81DF9C}" type="datetimeFigureOut">
               <a:rPr lang="en-IN" smtClean="0"/>
-              <a:t>28-12-2019</a:t>
+              <a:t>28-01-2020</a:t>
             </a:fld>
             <a:endParaRPr lang="en-IN"/>
           </a:p>
@@ -671,7 +671,7 @@
           <a:p>
             <a:fld id="{78381842-BAF7-452C-8AA1-F4B9FB81DF9C}" type="datetimeFigureOut">
               <a:rPr lang="en-IN" smtClean="0"/>
-              <a:t>28-12-2019</a:t>
+              <a:t>28-01-2020</a:t>
             </a:fld>
             <a:endParaRPr lang="en-IN"/>
           </a:p>
@@ -871,7 +871,7 @@
           <a:p>
             <a:fld id="{78381842-BAF7-452C-8AA1-F4B9FB81DF9C}" type="datetimeFigureOut">
               <a:rPr lang="en-IN" smtClean="0"/>
-              <a:t>28-12-2019</a:t>
+              <a:t>28-01-2020</a:t>
             </a:fld>
             <a:endParaRPr lang="en-IN"/>
           </a:p>
@@ -1147,7 +1147,7 @@
           <a:p>
             <a:fld id="{78381842-BAF7-452C-8AA1-F4B9FB81DF9C}" type="datetimeFigureOut">
               <a:rPr lang="en-IN" smtClean="0"/>
-              <a:t>28-12-2019</a:t>
+              <a:t>28-01-2020</a:t>
             </a:fld>
             <a:endParaRPr lang="en-IN"/>
           </a:p>
@@ -1415,7 +1415,7 @@
           <a:p>
             <a:fld id="{78381842-BAF7-452C-8AA1-F4B9FB81DF9C}" type="datetimeFigureOut">
               <a:rPr lang="en-IN" smtClean="0"/>
-              <a:t>28-12-2019</a:t>
+              <a:t>28-01-2020</a:t>
             </a:fld>
             <a:endParaRPr lang="en-IN"/>
           </a:p>
@@ -1830,7 +1830,7 @@
           <a:p>
             <a:fld id="{78381842-BAF7-452C-8AA1-F4B9FB81DF9C}" type="datetimeFigureOut">
               <a:rPr lang="en-IN" smtClean="0"/>
-              <a:t>28-12-2019</a:t>
+              <a:t>28-01-2020</a:t>
             </a:fld>
             <a:endParaRPr lang="en-IN"/>
           </a:p>
@@ -1972,7 +1972,7 @@
           <a:p>
             <a:fld id="{78381842-BAF7-452C-8AA1-F4B9FB81DF9C}" type="datetimeFigureOut">
               <a:rPr lang="en-IN" smtClean="0"/>
-              <a:t>28-12-2019</a:t>
+              <a:t>28-01-2020</a:t>
             </a:fld>
             <a:endParaRPr lang="en-IN"/>
           </a:p>
@@ -2085,7 +2085,7 @@
           <a:p>
             <a:fld id="{78381842-BAF7-452C-8AA1-F4B9FB81DF9C}" type="datetimeFigureOut">
               <a:rPr lang="en-IN" smtClean="0"/>
-              <a:t>28-12-2019</a:t>
+              <a:t>28-01-2020</a:t>
             </a:fld>
             <a:endParaRPr lang="en-IN"/>
           </a:p>
@@ -2398,7 +2398,7 @@
           <a:p>
             <a:fld id="{78381842-BAF7-452C-8AA1-F4B9FB81DF9C}" type="datetimeFigureOut">
               <a:rPr lang="en-IN" smtClean="0"/>
-              <a:t>28-12-2019</a:t>
+              <a:t>28-01-2020</a:t>
             </a:fld>
             <a:endParaRPr lang="en-IN"/>
           </a:p>
@@ -2687,7 +2687,7 @@
           <a:p>
             <a:fld id="{78381842-BAF7-452C-8AA1-F4B9FB81DF9C}" type="datetimeFigureOut">
               <a:rPr lang="en-IN" smtClean="0"/>
-              <a:t>28-12-2019</a:t>
+              <a:t>28-01-2020</a:t>
             </a:fld>
             <a:endParaRPr lang="en-IN"/>
           </a:p>
@@ -2930,7 +2930,7 @@
           <a:p>
             <a:fld id="{78381842-BAF7-452C-8AA1-F4B9FB81DF9C}" type="datetimeFigureOut">
               <a:rPr lang="en-IN" smtClean="0"/>
-              <a:t>28-12-2019</a:t>
+              <a:t>28-01-2020</a:t>
             </a:fld>
             <a:endParaRPr lang="en-IN"/>
           </a:p>
@@ -3347,826 +3347,189 @@
           <a:chExt cx="0" cy="0"/>
         </a:xfrm>
       </p:grpSpPr>
-      <p:sp>
-        <p:nvSpPr>
-          <p:cNvPr id="4" name="Rectangle 3">
-            <a:extLst>
-              <a:ext uri="{FF2B5EF4-FFF2-40B4-BE49-F238E27FC236}">
-                <a16:creationId xmlns:a16="http://schemas.microsoft.com/office/drawing/2014/main" id="{09FA27AF-D574-48F1-AA28-193F01B3F40B}"/>
-              </a:ext>
-            </a:extLst>
-          </p:cNvPr>
-          <p:cNvSpPr/>
+      <p:grpSp>
+        <p:nvGrpSpPr>
+          <p:cNvPr id="4" name="Group 3"/>
+          <p:cNvGrpSpPr/>
           <p:nvPr/>
-        </p:nvSpPr>
-        <p:spPr>
+        </p:nvGrpSpPr>
+        <p:grpSpPr>
           <a:xfrm>
-            <a:off x="805343" y="511728"/>
-            <a:ext cx="2520000" cy="2520000"/>
+            <a:off x="2699125" y="240127"/>
+            <a:ext cx="3600000" cy="3600000"/>
+            <a:chOff x="2699125" y="240127"/>
+            <a:chExt cx="3600000" cy="3600000"/>
           </a:xfrm>
-          <a:prstGeom prst="rect">
-            <a:avLst/>
-          </a:prstGeom>
-          <a:ln>
-            <a:noFill/>
-          </a:ln>
-        </p:spPr>
-        <p:style>
-          <a:lnRef idx="2">
-            <a:schemeClr val="dk1">
-              <a:shade val="50000"/>
-            </a:schemeClr>
-          </a:lnRef>
-          <a:fillRef idx="1">
-            <a:schemeClr val="dk1"/>
-          </a:fillRef>
-          <a:effectRef idx="0">
-            <a:schemeClr val="dk1"/>
-          </a:effectRef>
-          <a:fontRef idx="minor">
-            <a:schemeClr val="lt1"/>
-          </a:fontRef>
-        </p:style>
-        <p:txBody>
-          <a:bodyPr rtlCol="0" anchor="ctr"/>
-          <a:lstStyle/>
-          <a:p>
-            <a:pPr algn="ctr"/>
-            <a:endParaRPr lang="en-IN"/>
-          </a:p>
-        </p:txBody>
-      </p:sp>
-      <p:sp>
-        <p:nvSpPr>
-          <p:cNvPr id="5" name="Rectangle 4">
-            <a:extLst>
-              <a:ext uri="{FF2B5EF4-FFF2-40B4-BE49-F238E27FC236}">
-                <a16:creationId xmlns:a16="http://schemas.microsoft.com/office/drawing/2014/main" id="{130A11A4-934F-4B11-8951-E08B0B94C707}"/>
-              </a:ext>
-            </a:extLst>
-          </p:cNvPr>
-          <p:cNvSpPr/>
-          <p:nvPr/>
-        </p:nvSpPr>
-        <p:spPr>
-          <a:xfrm>
-            <a:off x="1156951" y="2305463"/>
-            <a:ext cx="360000" cy="360000"/>
-          </a:xfrm>
-          <a:prstGeom prst="rect">
-            <a:avLst/>
-          </a:prstGeom>
-          <a:solidFill>
-            <a:schemeClr val="bg1"/>
-          </a:solidFill>
-          <a:ln>
-            <a:noFill/>
-          </a:ln>
-        </p:spPr>
-        <p:style>
-          <a:lnRef idx="2">
-            <a:schemeClr val="accent1">
-              <a:shade val="50000"/>
-            </a:schemeClr>
-          </a:lnRef>
-          <a:fillRef idx="1">
-            <a:schemeClr val="accent1"/>
-          </a:fillRef>
-          <a:effectRef idx="0">
-            <a:schemeClr val="accent1"/>
-          </a:effectRef>
-          <a:fontRef idx="minor">
-            <a:schemeClr val="lt1"/>
-          </a:fontRef>
-        </p:style>
-        <p:txBody>
-          <a:bodyPr rtlCol="0" anchor="ctr"/>
-          <a:lstStyle/>
-          <a:p>
-            <a:pPr algn="ctr"/>
-            <a:endParaRPr lang="en-IN"/>
-          </a:p>
-        </p:txBody>
-      </p:sp>
-      <p:sp>
-        <p:nvSpPr>
-          <p:cNvPr id="6" name="Rectangle 5">
-            <a:extLst>
-              <a:ext uri="{FF2B5EF4-FFF2-40B4-BE49-F238E27FC236}">
-                <a16:creationId xmlns:a16="http://schemas.microsoft.com/office/drawing/2014/main" id="{6161C88D-070B-4F02-82A6-885457DC5726}"/>
-              </a:ext>
-            </a:extLst>
-          </p:cNvPr>
-          <p:cNvSpPr/>
-          <p:nvPr/>
-        </p:nvSpPr>
-        <p:spPr>
-          <a:xfrm>
-            <a:off x="1163215" y="871728"/>
-            <a:ext cx="1080000" cy="1080000"/>
-          </a:xfrm>
-          <a:prstGeom prst="rect">
-            <a:avLst/>
-          </a:prstGeom>
-          <a:solidFill>
-            <a:schemeClr val="bg1"/>
-          </a:solidFill>
-          <a:ln>
-            <a:noFill/>
-          </a:ln>
-        </p:spPr>
-        <p:style>
-          <a:lnRef idx="2">
-            <a:schemeClr val="accent1">
-              <a:shade val="50000"/>
-            </a:schemeClr>
-          </a:lnRef>
-          <a:fillRef idx="1">
-            <a:schemeClr val="accent1"/>
-          </a:fillRef>
-          <a:effectRef idx="0">
-            <a:schemeClr val="accent1"/>
-          </a:effectRef>
-          <a:fontRef idx="minor">
-            <a:schemeClr val="lt1"/>
-          </a:fontRef>
-        </p:style>
-        <p:txBody>
-          <a:bodyPr rtlCol="0" anchor="ctr"/>
-          <a:lstStyle/>
-          <a:p>
-            <a:pPr algn="ctr"/>
-            <a:endParaRPr lang="en-IN"/>
-          </a:p>
-        </p:txBody>
-      </p:sp>
-      <p:sp>
-        <p:nvSpPr>
-          <p:cNvPr id="24" name="Rectangle 23">
-            <a:extLst>
-              <a:ext uri="{FF2B5EF4-FFF2-40B4-BE49-F238E27FC236}">
-                <a16:creationId xmlns:a16="http://schemas.microsoft.com/office/drawing/2014/main" id="{BAFA02FB-2E00-4858-8482-EC754D98212D}"/>
-              </a:ext>
-            </a:extLst>
-          </p:cNvPr>
-          <p:cNvSpPr/>
-          <p:nvPr/>
-        </p:nvSpPr>
-        <p:spPr>
-          <a:xfrm>
-            <a:off x="1516951" y="1225463"/>
-            <a:ext cx="360000" cy="360000"/>
-          </a:xfrm>
-          <a:prstGeom prst="rect">
-            <a:avLst/>
-          </a:prstGeom>
-          <a:ln>
-            <a:noFill/>
-          </a:ln>
-        </p:spPr>
-        <p:style>
-          <a:lnRef idx="2">
-            <a:schemeClr val="dk1">
-              <a:shade val="50000"/>
-            </a:schemeClr>
-          </a:lnRef>
-          <a:fillRef idx="1">
-            <a:schemeClr val="dk1"/>
-          </a:fillRef>
-          <a:effectRef idx="0">
-            <a:schemeClr val="dk1"/>
-          </a:effectRef>
-          <a:fontRef idx="minor">
-            <a:schemeClr val="lt1"/>
-          </a:fontRef>
-        </p:style>
-        <p:txBody>
-          <a:bodyPr rtlCol="0" anchor="ctr"/>
-          <a:lstStyle/>
-          <a:p>
-            <a:pPr algn="ctr"/>
-            <a:endParaRPr lang="en-IN"/>
-          </a:p>
-        </p:txBody>
-      </p:sp>
-      <p:sp>
-        <p:nvSpPr>
-          <p:cNvPr id="25" name="Rectangle 24">
-            <a:extLst>
-              <a:ext uri="{FF2B5EF4-FFF2-40B4-BE49-F238E27FC236}">
-                <a16:creationId xmlns:a16="http://schemas.microsoft.com/office/drawing/2014/main" id="{049A357B-AD42-4014-8FF4-886E2ADF8D90}"/>
-              </a:ext>
-            </a:extLst>
-          </p:cNvPr>
-          <p:cNvSpPr/>
-          <p:nvPr/>
-        </p:nvSpPr>
-        <p:spPr>
-          <a:xfrm>
-            <a:off x="1868559" y="2305463"/>
-            <a:ext cx="360000" cy="360000"/>
-          </a:xfrm>
-          <a:prstGeom prst="rect">
-            <a:avLst/>
-          </a:prstGeom>
-          <a:solidFill>
-            <a:schemeClr val="bg1"/>
-          </a:solidFill>
-          <a:ln>
-            <a:noFill/>
-          </a:ln>
-        </p:spPr>
-        <p:style>
-          <a:lnRef idx="2">
-            <a:schemeClr val="accent1">
-              <a:shade val="50000"/>
-            </a:schemeClr>
-          </a:lnRef>
-          <a:fillRef idx="1">
-            <a:schemeClr val="accent1"/>
-          </a:fillRef>
-          <a:effectRef idx="0">
-            <a:schemeClr val="accent1"/>
-          </a:effectRef>
-          <a:fontRef idx="minor">
-            <a:schemeClr val="lt1"/>
-          </a:fontRef>
-        </p:style>
-        <p:txBody>
-          <a:bodyPr rtlCol="0" anchor="ctr"/>
-          <a:lstStyle/>
-          <a:p>
-            <a:pPr algn="ctr"/>
-            <a:endParaRPr lang="en-IN"/>
-          </a:p>
-        </p:txBody>
-      </p:sp>
-      <p:sp>
-        <p:nvSpPr>
-          <p:cNvPr id="26" name="Rectangle 25">
-            <a:extLst>
-              <a:ext uri="{FF2B5EF4-FFF2-40B4-BE49-F238E27FC236}">
-                <a16:creationId xmlns:a16="http://schemas.microsoft.com/office/drawing/2014/main" id="{E4A352D8-F9D4-4C4F-B74B-E109E3F11DA8}"/>
-              </a:ext>
-            </a:extLst>
-          </p:cNvPr>
-          <p:cNvSpPr/>
-          <p:nvPr/>
-        </p:nvSpPr>
-        <p:spPr>
-          <a:xfrm>
-            <a:off x="2616460" y="2305463"/>
-            <a:ext cx="360000" cy="360000"/>
-          </a:xfrm>
-          <a:prstGeom prst="rect">
-            <a:avLst/>
-          </a:prstGeom>
-          <a:solidFill>
-            <a:schemeClr val="bg1"/>
-          </a:solidFill>
-          <a:ln>
-            <a:noFill/>
-          </a:ln>
-        </p:spPr>
-        <p:style>
-          <a:lnRef idx="2">
-            <a:schemeClr val="accent1">
-              <a:shade val="50000"/>
-            </a:schemeClr>
-          </a:lnRef>
-          <a:fillRef idx="1">
-            <a:schemeClr val="accent1"/>
-          </a:fillRef>
-          <a:effectRef idx="0">
-            <a:schemeClr val="accent1"/>
-          </a:effectRef>
-          <a:fontRef idx="minor">
-            <a:schemeClr val="lt1"/>
-          </a:fontRef>
-        </p:style>
-        <p:txBody>
-          <a:bodyPr rtlCol="0" anchor="ctr"/>
-          <a:lstStyle/>
-          <a:p>
-            <a:pPr algn="ctr"/>
-            <a:endParaRPr lang="en-IN"/>
-          </a:p>
-        </p:txBody>
-      </p:sp>
-      <p:sp>
-        <p:nvSpPr>
-          <p:cNvPr id="27" name="Rectangle 26">
-            <a:extLst>
-              <a:ext uri="{FF2B5EF4-FFF2-40B4-BE49-F238E27FC236}">
-                <a16:creationId xmlns:a16="http://schemas.microsoft.com/office/drawing/2014/main" id="{9DE70322-45E8-4EC9-831D-9DE9E86E5A75}"/>
-              </a:ext>
-            </a:extLst>
-          </p:cNvPr>
-          <p:cNvSpPr/>
-          <p:nvPr/>
-        </p:nvSpPr>
-        <p:spPr>
-          <a:xfrm>
-            <a:off x="2616460" y="1585463"/>
-            <a:ext cx="360000" cy="360000"/>
-          </a:xfrm>
-          <a:prstGeom prst="rect">
-            <a:avLst/>
-          </a:prstGeom>
-          <a:solidFill>
-            <a:schemeClr val="bg1"/>
-          </a:solidFill>
-          <a:ln>
-            <a:noFill/>
-          </a:ln>
-        </p:spPr>
-        <p:style>
-          <a:lnRef idx="2">
-            <a:schemeClr val="accent1">
-              <a:shade val="50000"/>
-            </a:schemeClr>
-          </a:lnRef>
-          <a:fillRef idx="1">
-            <a:schemeClr val="accent1"/>
-          </a:fillRef>
-          <a:effectRef idx="0">
-            <a:schemeClr val="accent1"/>
-          </a:effectRef>
-          <a:fontRef idx="minor">
-            <a:schemeClr val="lt1"/>
-          </a:fontRef>
-        </p:style>
-        <p:txBody>
-          <a:bodyPr rtlCol="0" anchor="ctr"/>
-          <a:lstStyle/>
-          <a:p>
-            <a:pPr algn="ctr"/>
-            <a:endParaRPr lang="en-IN"/>
-          </a:p>
-        </p:txBody>
-      </p:sp>
-      <p:sp>
-        <p:nvSpPr>
-          <p:cNvPr id="28" name="Rectangle 27">
-            <a:extLst>
-              <a:ext uri="{FF2B5EF4-FFF2-40B4-BE49-F238E27FC236}">
-                <a16:creationId xmlns:a16="http://schemas.microsoft.com/office/drawing/2014/main" id="{05CEAD4D-BD35-4AE3-B133-FAD24B8BB64B}"/>
-              </a:ext>
-            </a:extLst>
-          </p:cNvPr>
-          <p:cNvSpPr/>
-          <p:nvPr/>
-        </p:nvSpPr>
-        <p:spPr>
-          <a:xfrm>
-            <a:off x="2604279" y="868639"/>
-            <a:ext cx="360000" cy="360000"/>
-          </a:xfrm>
-          <a:prstGeom prst="rect">
-            <a:avLst/>
-          </a:prstGeom>
-          <a:solidFill>
-            <a:schemeClr val="bg1"/>
-          </a:solidFill>
-          <a:ln>
-            <a:noFill/>
-          </a:ln>
-        </p:spPr>
-        <p:style>
-          <a:lnRef idx="2">
-            <a:schemeClr val="accent1">
-              <a:shade val="50000"/>
-            </a:schemeClr>
-          </a:lnRef>
-          <a:fillRef idx="1">
-            <a:schemeClr val="accent1"/>
-          </a:fillRef>
-          <a:effectRef idx="0">
-            <a:schemeClr val="accent1"/>
-          </a:effectRef>
-          <a:fontRef idx="minor">
-            <a:schemeClr val="lt1"/>
-          </a:fontRef>
-        </p:style>
-        <p:txBody>
-          <a:bodyPr rtlCol="0" anchor="ctr"/>
-          <a:lstStyle/>
-          <a:p>
-            <a:pPr algn="ctr"/>
-            <a:endParaRPr lang="en-IN"/>
-          </a:p>
-        </p:txBody>
-      </p:sp>
-      <p:sp>
-        <p:nvSpPr>
-          <p:cNvPr id="30" name="Rectangle 29">
-            <a:extLst>
-              <a:ext uri="{FF2B5EF4-FFF2-40B4-BE49-F238E27FC236}">
-                <a16:creationId xmlns:a16="http://schemas.microsoft.com/office/drawing/2014/main" id="{64B3E7C7-F4C9-4921-9C09-961BD297CAFA}"/>
-              </a:ext>
-            </a:extLst>
-          </p:cNvPr>
-          <p:cNvSpPr/>
-          <p:nvPr/>
-        </p:nvSpPr>
-        <p:spPr>
-          <a:xfrm rot="2700000">
-            <a:off x="6057020" y="852882"/>
-            <a:ext cx="2520000" cy="2520000"/>
-          </a:xfrm>
-          <a:prstGeom prst="rect">
-            <a:avLst/>
-          </a:prstGeom>
-          <a:ln>
-            <a:noFill/>
-          </a:ln>
-        </p:spPr>
-        <p:style>
-          <a:lnRef idx="2">
-            <a:schemeClr val="dk1">
-              <a:shade val="50000"/>
-            </a:schemeClr>
-          </a:lnRef>
-          <a:fillRef idx="1">
-            <a:schemeClr val="dk1"/>
-          </a:fillRef>
-          <a:effectRef idx="0">
-            <a:schemeClr val="dk1"/>
-          </a:effectRef>
-          <a:fontRef idx="minor">
-            <a:schemeClr val="lt1"/>
-          </a:fontRef>
-        </p:style>
-        <p:txBody>
-          <a:bodyPr rtlCol="0" anchor="ctr"/>
-          <a:lstStyle/>
-          <a:p>
-            <a:pPr algn="ctr"/>
-            <a:endParaRPr lang="en-IN"/>
-          </a:p>
-        </p:txBody>
-      </p:sp>
-      <p:sp>
-        <p:nvSpPr>
-          <p:cNvPr id="31" name="Rectangle 30">
-            <a:extLst>
-              <a:ext uri="{FF2B5EF4-FFF2-40B4-BE49-F238E27FC236}">
-                <a16:creationId xmlns:a16="http://schemas.microsoft.com/office/drawing/2014/main" id="{BC8766AB-7D5D-48A0-8C17-C21B03AC03F3}"/>
-              </a:ext>
-            </a:extLst>
-          </p:cNvPr>
-          <p:cNvSpPr/>
-          <p:nvPr/>
-        </p:nvSpPr>
-        <p:spPr>
-          <a:xfrm rot="2700000">
-            <a:off x="6117283" y="1922518"/>
-            <a:ext cx="360000" cy="360000"/>
-          </a:xfrm>
-          <a:prstGeom prst="rect">
-            <a:avLst/>
-          </a:prstGeom>
-          <a:solidFill>
-            <a:schemeClr val="bg1"/>
-          </a:solidFill>
-          <a:ln>
-            <a:noFill/>
-          </a:ln>
-        </p:spPr>
-        <p:style>
-          <a:lnRef idx="2">
-            <a:schemeClr val="accent1">
-              <a:shade val="50000"/>
-            </a:schemeClr>
-          </a:lnRef>
-          <a:fillRef idx="1">
-            <a:schemeClr val="accent1"/>
-          </a:fillRef>
-          <a:effectRef idx="0">
-            <a:schemeClr val="accent1"/>
-          </a:effectRef>
-          <a:fontRef idx="minor">
-            <a:schemeClr val="lt1"/>
-          </a:fontRef>
-        </p:style>
-        <p:txBody>
-          <a:bodyPr rtlCol="0" anchor="ctr"/>
-          <a:lstStyle/>
-          <a:p>
-            <a:pPr algn="ctr"/>
-            <a:endParaRPr lang="en-IN"/>
-          </a:p>
-        </p:txBody>
-      </p:sp>
-      <p:sp>
-        <p:nvSpPr>
-          <p:cNvPr id="32" name="Rectangle 31">
-            <a:extLst>
-              <a:ext uri="{FF2B5EF4-FFF2-40B4-BE49-F238E27FC236}">
-                <a16:creationId xmlns:a16="http://schemas.microsoft.com/office/drawing/2014/main" id="{A3FFEAB0-F515-4D02-BC1C-F04CCB139A47}"/>
-              </a:ext>
-            </a:extLst>
-          </p:cNvPr>
-          <p:cNvSpPr/>
-          <p:nvPr/>
-        </p:nvSpPr>
-        <p:spPr>
-          <a:xfrm rot="2700000">
-            <a:off x="6775516" y="1062260"/>
-            <a:ext cx="1080000" cy="1080000"/>
-          </a:xfrm>
-          <a:prstGeom prst="rect">
-            <a:avLst/>
-          </a:prstGeom>
-          <a:solidFill>
-            <a:schemeClr val="bg1"/>
-          </a:solidFill>
-          <a:ln>
-            <a:noFill/>
-          </a:ln>
-        </p:spPr>
-        <p:style>
-          <a:lnRef idx="2">
-            <a:schemeClr val="accent1">
-              <a:shade val="50000"/>
-            </a:schemeClr>
-          </a:lnRef>
-          <a:fillRef idx="1">
-            <a:schemeClr val="accent1"/>
-          </a:fillRef>
-          <a:effectRef idx="0">
-            <a:schemeClr val="accent1"/>
-          </a:effectRef>
-          <a:fontRef idx="minor">
-            <a:schemeClr val="lt1"/>
-          </a:fontRef>
-        </p:style>
-        <p:txBody>
-          <a:bodyPr rtlCol="0" anchor="ctr"/>
-          <a:lstStyle/>
-          <a:p>
-            <a:pPr algn="ctr"/>
-            <a:endParaRPr lang="en-IN"/>
-          </a:p>
-        </p:txBody>
-      </p:sp>
-      <p:sp>
-        <p:nvSpPr>
-          <p:cNvPr id="33" name="Rectangle 32">
-            <a:extLst>
-              <a:ext uri="{FF2B5EF4-FFF2-40B4-BE49-F238E27FC236}">
-                <a16:creationId xmlns:a16="http://schemas.microsoft.com/office/drawing/2014/main" id="{E9150DE6-4447-4C6B-BC2E-9346DE570F75}"/>
-              </a:ext>
-            </a:extLst>
-          </p:cNvPr>
-          <p:cNvSpPr/>
-          <p:nvPr/>
-        </p:nvSpPr>
-        <p:spPr>
-          <a:xfrm rot="2700000">
-            <a:off x="7135516" y="1413401"/>
-            <a:ext cx="360000" cy="360000"/>
-          </a:xfrm>
-          <a:prstGeom prst="rect">
-            <a:avLst/>
-          </a:prstGeom>
-          <a:ln>
-            <a:noFill/>
-          </a:ln>
-        </p:spPr>
-        <p:style>
-          <a:lnRef idx="2">
-            <a:schemeClr val="dk1">
-              <a:shade val="50000"/>
-            </a:schemeClr>
-          </a:lnRef>
-          <a:fillRef idx="1">
-            <a:schemeClr val="dk1"/>
-          </a:fillRef>
-          <a:effectRef idx="0">
-            <a:schemeClr val="dk1"/>
-          </a:effectRef>
-          <a:fontRef idx="minor">
-            <a:schemeClr val="lt1"/>
-          </a:fontRef>
-        </p:style>
-        <p:txBody>
-          <a:bodyPr rtlCol="0" anchor="ctr"/>
-          <a:lstStyle/>
-          <a:p>
-            <a:pPr algn="ctr"/>
-            <a:endParaRPr lang="en-IN"/>
-          </a:p>
-        </p:txBody>
-      </p:sp>
-      <p:sp>
-        <p:nvSpPr>
-          <p:cNvPr id="34" name="Rectangle 33">
-            <a:extLst>
-              <a:ext uri="{FF2B5EF4-FFF2-40B4-BE49-F238E27FC236}">
-                <a16:creationId xmlns:a16="http://schemas.microsoft.com/office/drawing/2014/main" id="{944FEF76-BE2E-4190-8996-DD86390D6248}"/>
-              </a:ext>
-            </a:extLst>
-          </p:cNvPr>
-          <p:cNvSpPr/>
-          <p:nvPr/>
-        </p:nvSpPr>
-        <p:spPr>
-          <a:xfrm rot="2700000">
-            <a:off x="6620465" y="2425700"/>
-            <a:ext cx="360000" cy="360000"/>
-          </a:xfrm>
-          <a:prstGeom prst="rect">
-            <a:avLst/>
-          </a:prstGeom>
-          <a:solidFill>
-            <a:schemeClr val="bg1"/>
-          </a:solidFill>
-          <a:ln>
-            <a:noFill/>
-          </a:ln>
-        </p:spPr>
-        <p:style>
-          <a:lnRef idx="2">
-            <a:schemeClr val="accent1">
-              <a:shade val="50000"/>
-            </a:schemeClr>
-          </a:lnRef>
-          <a:fillRef idx="1">
-            <a:schemeClr val="accent1"/>
-          </a:fillRef>
-          <a:effectRef idx="0">
-            <a:schemeClr val="accent1"/>
-          </a:effectRef>
-          <a:fontRef idx="minor">
-            <a:schemeClr val="lt1"/>
-          </a:fontRef>
-        </p:style>
-        <p:txBody>
-          <a:bodyPr rtlCol="0" anchor="ctr"/>
-          <a:lstStyle/>
-          <a:p>
-            <a:pPr algn="ctr"/>
-            <a:endParaRPr lang="en-IN"/>
-          </a:p>
-        </p:txBody>
-      </p:sp>
-      <p:sp>
-        <p:nvSpPr>
-          <p:cNvPr id="35" name="Rectangle 34">
-            <a:extLst>
-              <a:ext uri="{FF2B5EF4-FFF2-40B4-BE49-F238E27FC236}">
-                <a16:creationId xmlns:a16="http://schemas.microsoft.com/office/drawing/2014/main" id="{0C4885E0-2908-496A-A106-382E0D35BFF8}"/>
-              </a:ext>
-            </a:extLst>
-          </p:cNvPr>
-          <p:cNvSpPr/>
-          <p:nvPr/>
-        </p:nvSpPr>
-        <p:spPr>
-          <a:xfrm rot="2700000">
-            <a:off x="7149311" y="2954546"/>
-            <a:ext cx="360000" cy="360000"/>
-          </a:xfrm>
-          <a:prstGeom prst="rect">
-            <a:avLst/>
-          </a:prstGeom>
-          <a:solidFill>
-            <a:schemeClr val="bg1"/>
-          </a:solidFill>
-          <a:ln>
-            <a:noFill/>
-          </a:ln>
-        </p:spPr>
-        <p:style>
-          <a:lnRef idx="2">
-            <a:schemeClr val="accent1">
-              <a:shade val="50000"/>
-            </a:schemeClr>
-          </a:lnRef>
-          <a:fillRef idx="1">
-            <a:schemeClr val="accent1"/>
-          </a:fillRef>
-          <a:effectRef idx="0">
-            <a:schemeClr val="accent1"/>
-          </a:effectRef>
-          <a:fontRef idx="minor">
-            <a:schemeClr val="lt1"/>
-          </a:fontRef>
-        </p:style>
-        <p:txBody>
-          <a:bodyPr rtlCol="0" anchor="ctr"/>
-          <a:lstStyle/>
-          <a:p>
-            <a:pPr algn="ctr"/>
-            <a:endParaRPr lang="en-IN"/>
-          </a:p>
-        </p:txBody>
-      </p:sp>
-      <p:sp>
-        <p:nvSpPr>
-          <p:cNvPr id="36" name="Rectangle 35">
-            <a:extLst>
-              <a:ext uri="{FF2B5EF4-FFF2-40B4-BE49-F238E27FC236}">
-                <a16:creationId xmlns:a16="http://schemas.microsoft.com/office/drawing/2014/main" id="{0ACE7EE0-3D4E-4901-A2FE-1A56F1BCB743}"/>
-              </a:ext>
-            </a:extLst>
-          </p:cNvPr>
-          <p:cNvSpPr/>
-          <p:nvPr/>
-        </p:nvSpPr>
-        <p:spPr>
-          <a:xfrm rot="2700000">
-            <a:off x="7658428" y="2445429"/>
-            <a:ext cx="360000" cy="360000"/>
-          </a:xfrm>
-          <a:prstGeom prst="rect">
-            <a:avLst/>
-          </a:prstGeom>
-          <a:solidFill>
-            <a:schemeClr val="bg1"/>
-          </a:solidFill>
-          <a:ln>
-            <a:noFill/>
-          </a:ln>
-        </p:spPr>
-        <p:style>
-          <a:lnRef idx="2">
-            <a:schemeClr val="accent1">
-              <a:shade val="50000"/>
-            </a:schemeClr>
-          </a:lnRef>
-          <a:fillRef idx="1">
-            <a:schemeClr val="accent1"/>
-          </a:fillRef>
-          <a:effectRef idx="0">
-            <a:schemeClr val="accent1"/>
-          </a:effectRef>
-          <a:fontRef idx="minor">
-            <a:schemeClr val="lt1"/>
-          </a:fontRef>
-        </p:style>
-        <p:txBody>
-          <a:bodyPr rtlCol="0" anchor="ctr"/>
-          <a:lstStyle/>
-          <a:p>
-            <a:pPr algn="ctr"/>
-            <a:endParaRPr lang="en-IN"/>
-          </a:p>
-        </p:txBody>
-      </p:sp>
-      <p:sp>
-        <p:nvSpPr>
-          <p:cNvPr id="37" name="Rectangle 36">
-            <a:extLst>
-              <a:ext uri="{FF2B5EF4-FFF2-40B4-BE49-F238E27FC236}">
-                <a16:creationId xmlns:a16="http://schemas.microsoft.com/office/drawing/2014/main" id="{A46B1CEC-C670-46EF-A4FE-3D64CA97AF85}"/>
-              </a:ext>
-            </a:extLst>
-          </p:cNvPr>
-          <p:cNvSpPr/>
-          <p:nvPr/>
-        </p:nvSpPr>
-        <p:spPr>
-          <a:xfrm rot="2700000">
-            <a:off x="8156686" y="1929945"/>
-            <a:ext cx="360000" cy="360000"/>
-          </a:xfrm>
-          <a:prstGeom prst="rect">
-            <a:avLst/>
-          </a:prstGeom>
-          <a:solidFill>
-            <a:schemeClr val="bg1"/>
-          </a:solidFill>
-          <a:ln>
-            <a:noFill/>
-          </a:ln>
-        </p:spPr>
-        <p:style>
-          <a:lnRef idx="2">
-            <a:schemeClr val="accent1">
-              <a:shade val="50000"/>
-            </a:schemeClr>
-          </a:lnRef>
-          <a:fillRef idx="1">
-            <a:schemeClr val="accent1"/>
-          </a:fillRef>
-          <a:effectRef idx="0">
-            <a:schemeClr val="accent1"/>
-          </a:effectRef>
-          <a:fontRef idx="minor">
-            <a:schemeClr val="lt1"/>
-          </a:fontRef>
-        </p:style>
-        <p:txBody>
-          <a:bodyPr rtlCol="0" anchor="ctr"/>
-          <a:lstStyle/>
-          <a:p>
-            <a:pPr algn="ctr"/>
-            <a:endParaRPr lang="en-IN"/>
-          </a:p>
-        </p:txBody>
-      </p:sp>
+        </p:grpSpPr>
+        <p:sp>
+          <p:nvSpPr>
+            <p:cNvPr id="8" name="Rectangle 7"/>
+            <p:cNvSpPr/>
+            <p:nvPr/>
+          </p:nvSpPr>
+          <p:spPr>
+            <a:xfrm>
+              <a:off x="2699125" y="240127"/>
+              <a:ext cx="3600000" cy="3600000"/>
+            </a:xfrm>
+            <a:prstGeom prst="rect">
+              <a:avLst/>
+            </a:prstGeom>
+            <a:ln>
+              <a:noFill/>
+            </a:ln>
+          </p:spPr>
+          <p:style>
+            <a:lnRef idx="2">
+              <a:schemeClr val="accent6"/>
+            </a:lnRef>
+            <a:fillRef idx="1">
+              <a:schemeClr val="lt1"/>
+            </a:fillRef>
+            <a:effectRef idx="0">
+              <a:schemeClr val="accent6"/>
+            </a:effectRef>
+            <a:fontRef idx="minor">
+              <a:schemeClr val="dk1"/>
+            </a:fontRef>
+          </p:style>
+          <p:txBody>
+            <a:bodyPr rtlCol="0" anchor="ctr"/>
+            <a:lstStyle/>
+            <a:p>
+              <a:pPr algn="r"/>
+              <a:endParaRPr lang="en-IN"/>
+            </a:p>
+          </p:txBody>
+        </p:sp>
+        <p:sp>
+          <p:nvSpPr>
+            <p:cNvPr id="2" name="Rectangle 1"/>
+            <p:cNvSpPr/>
+            <p:nvPr/>
+          </p:nvSpPr>
+          <p:spPr>
+            <a:xfrm>
+              <a:off x="2879125" y="420127"/>
+              <a:ext cx="3240000" cy="3240000"/>
+            </a:xfrm>
+            <a:prstGeom prst="rect">
+              <a:avLst/>
+            </a:prstGeom>
+            <a:ln>
+              <a:noFill/>
+            </a:ln>
+          </p:spPr>
+          <p:style>
+            <a:lnRef idx="2">
+              <a:schemeClr val="dk1">
+                <a:shade val="50000"/>
+              </a:schemeClr>
+            </a:lnRef>
+            <a:fillRef idx="1">
+              <a:schemeClr val="dk1"/>
+            </a:fillRef>
+            <a:effectRef idx="0">
+              <a:schemeClr val="dk1"/>
+            </a:effectRef>
+            <a:fontRef idx="minor">
+              <a:schemeClr val="lt1"/>
+            </a:fontRef>
+          </p:style>
+          <p:txBody>
+            <a:bodyPr rtlCol="0" anchor="ctr"/>
+            <a:lstStyle/>
+            <a:p>
+              <a:pPr algn="r"/>
+              <a:endParaRPr lang="en-IN"/>
+            </a:p>
+          </p:txBody>
+        </p:sp>
+        <p:sp>
+          <p:nvSpPr>
+            <p:cNvPr id="3" name="Oval 2"/>
+            <p:cNvSpPr/>
+            <p:nvPr/>
+          </p:nvSpPr>
+          <p:spPr>
+            <a:xfrm>
+              <a:off x="3239125" y="780127"/>
+              <a:ext cx="2520000" cy="2520000"/>
+            </a:xfrm>
+            <a:prstGeom prst="ellipse">
+              <a:avLst/>
+            </a:prstGeom>
+            <a:ln>
+              <a:noFill/>
+            </a:ln>
+          </p:spPr>
+          <p:style>
+            <a:lnRef idx="2">
+              <a:schemeClr val="accent6"/>
+            </a:lnRef>
+            <a:fillRef idx="1">
+              <a:schemeClr val="lt1"/>
+            </a:fillRef>
+            <a:effectRef idx="0">
+              <a:schemeClr val="accent6"/>
+            </a:effectRef>
+            <a:fontRef idx="minor">
+              <a:schemeClr val="dk1"/>
+            </a:fontRef>
+          </p:style>
+          <p:txBody>
+            <a:bodyPr rtlCol="0" anchor="ctr"/>
+            <a:lstStyle/>
+            <a:p>
+              <a:pPr algn="r"/>
+              <a:endParaRPr lang="en-IN"/>
+            </a:p>
+          </p:txBody>
+        </p:sp>
+        <p:sp>
+          <p:nvSpPr>
+            <p:cNvPr id="7" name="Isosceles Triangle 6"/>
+            <p:cNvSpPr/>
+            <p:nvPr/>
+          </p:nvSpPr>
+          <p:spPr>
+            <a:xfrm>
+              <a:off x="3779125" y="1230127"/>
+              <a:ext cx="1440000" cy="1440000"/>
+            </a:xfrm>
+            <a:prstGeom prst="triangle">
+              <a:avLst/>
+            </a:prstGeom>
+            <a:ln>
+              <a:noFill/>
+            </a:ln>
+          </p:spPr>
+          <p:style>
+            <a:lnRef idx="2">
+              <a:schemeClr val="dk1">
+                <a:shade val="50000"/>
+              </a:schemeClr>
+            </a:lnRef>
+            <a:fillRef idx="1">
+              <a:schemeClr val="dk1"/>
+            </a:fillRef>
+            <a:effectRef idx="0">
+              <a:schemeClr val="dk1"/>
+            </a:effectRef>
+            <a:fontRef idx="minor">
+              <a:schemeClr val="lt1"/>
+            </a:fontRef>
+          </p:style>
+          <p:txBody>
+            <a:bodyPr rtlCol="0" anchor="ctr"/>
+            <a:lstStyle/>
+            <a:p>
+              <a:pPr algn="r"/>
+              <a:endParaRPr lang="en-IN"/>
+            </a:p>
+          </p:txBody>
+        </p:sp>
+      </p:grpSp>
     </p:spTree>
     <p:extLst>
       <p:ext uri="{BB962C8B-B14F-4D97-AF65-F5344CB8AC3E}">

</xml_diff>